<commit_message>
update meeting slides - added open issue on SDP vs. LTP
</commit_message>
<xml_diff>
--- a/meeting-materials/draft-liu-teas-transport-network-slice-yang-06.pptx
+++ b/meeting-materials/draft-liu-teas-transport-network-slice-yang-06.pptx
@@ -5,7 +5,7 @@
     <p:sldMasterId id="2147483648" r:id="rId6"/>
   </p:sldMasterIdLst>
   <p:notesMasterIdLst>
-    <p:notesMasterId r:id="rId17"/>
+    <p:notesMasterId r:id="rId18"/>
   </p:notesMasterIdLst>
   <p:sldIdLst>
     <p:sldId id="256" r:id="rId7"/>
@@ -16,8 +16,9 @@
     <p:sldId id="311" r:id="rId12"/>
     <p:sldId id="312" r:id="rId13"/>
     <p:sldId id="313" r:id="rId14"/>
-    <p:sldId id="300" r:id="rId15"/>
-    <p:sldId id="273" r:id="rId16"/>
+    <p:sldId id="316" r:id="rId15"/>
+    <p:sldId id="300" r:id="rId16"/>
+    <p:sldId id="273" r:id="rId17"/>
   </p:sldIdLst>
   <p:sldSz cx="12192000" cy="6858000"/>
   <p:notesSz cx="6858000" cy="9144000"/>
@@ -229,7 +230,7 @@
           <a:p>
             <a:fld id="{59711742-25F0-43F6-882D-B8403339F2D1}" type="datetimeFigureOut">
               <a:rPr lang="en-US" smtClean="0"/>
-              <a:t>3/23/2023</a:t>
+              <a:t>3/24/2023</a:t>
             </a:fld>
             <a:endParaRPr lang="en-US"/>
           </a:p>
@@ -1158,6 +1159,90 @@
     </p:spTree>
     <p:extLst>
       <p:ext uri="{BB962C8B-B14F-4D97-AF65-F5344CB8AC3E}">
+        <p14:creationId xmlns:p14="http://schemas.microsoft.com/office/powerpoint/2010/main" val="316465207"/>
+      </p:ext>
+    </p:extLst>
+  </p:cSld>
+  <p:clrMapOvr>
+    <a:masterClrMapping/>
+  </p:clrMapOvr>
+</p:notes>
+</file>
+
+<file path=ppt/notesSlides/notesSlide9.xml><?xml version="1.0" encoding="utf-8"?>
+<p:notes xmlns:a="http://schemas.openxmlformats.org/drawingml/2006/main" xmlns:r="http://schemas.openxmlformats.org/officeDocument/2006/relationships" xmlns:p="http://schemas.openxmlformats.org/presentationml/2006/main">
+  <p:cSld>
+    <p:spTree>
+      <p:nvGrpSpPr>
+        <p:cNvPr id="1" name=""/>
+        <p:cNvGrpSpPr/>
+        <p:nvPr/>
+      </p:nvGrpSpPr>
+      <p:grpSpPr>
+        <a:xfrm>
+          <a:off x="0" y="0"/>
+          <a:ext cx="0" cy="0"/>
+          <a:chOff x="0" y="0"/>
+          <a:chExt cx="0" cy="0"/>
+        </a:xfrm>
+      </p:grpSpPr>
+      <p:sp>
+        <p:nvSpPr>
+          <p:cNvPr id="2" name="Slide Image Placeholder 1"/>
+          <p:cNvSpPr>
+            <a:spLocks noGrp="1" noRot="1" noChangeAspect="1"/>
+          </p:cNvSpPr>
+          <p:nvPr>
+            <p:ph type="sldImg"/>
+          </p:nvPr>
+        </p:nvSpPr>
+        <p:spPr/>
+      </p:sp>
+      <p:sp>
+        <p:nvSpPr>
+          <p:cNvPr id="3" name="Notes Placeholder 2"/>
+          <p:cNvSpPr>
+            <a:spLocks noGrp="1"/>
+          </p:cNvSpPr>
+          <p:nvPr>
+            <p:ph type="body" idx="1"/>
+          </p:nvPr>
+        </p:nvSpPr>
+        <p:spPr/>
+        <p:txBody>
+          <a:bodyPr/>
+          <a:lstStyle/>
+          <a:p>
+            <a:endParaRPr lang="en-US" dirty="0"/>
+          </a:p>
+        </p:txBody>
+      </p:sp>
+      <p:sp>
+        <p:nvSpPr>
+          <p:cNvPr id="4" name="Slide Number Placeholder 3"/>
+          <p:cNvSpPr>
+            <a:spLocks noGrp="1"/>
+          </p:cNvSpPr>
+          <p:nvPr>
+            <p:ph type="sldNum" sz="quarter" idx="10"/>
+          </p:nvPr>
+        </p:nvSpPr>
+        <p:spPr/>
+        <p:txBody>
+          <a:bodyPr/>
+          <a:lstStyle/>
+          <a:p>
+            <a:fld id="{4066C2EC-F3B6-4CF7-8A67-99EC2A32E023}" type="slidenum">
+              <a:rPr lang="en-US" smtClean="0"/>
+              <a:t>10</a:t>
+            </a:fld>
+            <a:endParaRPr lang="en-US"/>
+          </a:p>
+        </p:txBody>
+      </p:sp>
+    </p:spTree>
+    <p:extLst>
+      <p:ext uri="{BB962C8B-B14F-4D97-AF65-F5344CB8AC3E}">
         <p14:creationId xmlns:p14="http://schemas.microsoft.com/office/powerpoint/2010/main" val="2040212658"/>
       </p:ext>
     </p:extLst>
@@ -1315,7 +1400,7 @@
           <a:p>
             <a:fld id="{11EADF87-7BA1-4934-894F-828C76552A18}" type="datetime1">
               <a:rPr lang="en-US" smtClean="0"/>
-              <a:t>3/23/2023</a:t>
+              <a:t>3/24/2023</a:t>
             </a:fld>
             <a:endParaRPr lang="en-US"/>
           </a:p>
@@ -1516,7 +1601,7 @@
           <a:p>
             <a:fld id="{85D92055-2432-4DF3-97D9-9AAC5D502BA1}" type="datetime1">
               <a:rPr lang="en-US" smtClean="0"/>
-              <a:t>3/23/2023</a:t>
+              <a:t>3/24/2023</a:t>
             </a:fld>
             <a:endParaRPr lang="en-US"/>
           </a:p>
@@ -1727,7 +1812,7 @@
           <a:p>
             <a:fld id="{9982AC4B-3F7F-442E-97CB-3FE75166B923}" type="datetime1">
               <a:rPr lang="en-US" smtClean="0"/>
-              <a:t>3/23/2023</a:t>
+              <a:t>3/24/2023</a:t>
             </a:fld>
             <a:endParaRPr lang="en-US"/>
           </a:p>
@@ -1928,7 +2013,7 @@
           <a:p>
             <a:fld id="{86764C34-DC39-41C4-8B6A-5EA7B47F74F1}" type="datetime1">
               <a:rPr lang="en-US" smtClean="0"/>
-              <a:t>3/23/2023</a:t>
+              <a:t>3/24/2023</a:t>
             </a:fld>
             <a:endParaRPr lang="en-US"/>
           </a:p>
@@ -2206,7 +2291,7 @@
           <a:p>
             <a:fld id="{9AD06E72-0C8D-44B3-AA53-2FB152485C62}" type="datetime1">
               <a:rPr lang="en-US" smtClean="0"/>
-              <a:t>3/23/2023</a:t>
+              <a:t>3/24/2023</a:t>
             </a:fld>
             <a:endParaRPr lang="en-US"/>
           </a:p>
@@ -2474,7 +2559,7 @@
           <a:p>
             <a:fld id="{66188E82-78A8-432F-A905-64D37DCF7108}" type="datetime1">
               <a:rPr lang="en-US" smtClean="0"/>
-              <a:t>3/23/2023</a:t>
+              <a:t>3/24/2023</a:t>
             </a:fld>
             <a:endParaRPr lang="en-US"/>
           </a:p>
@@ -2889,7 +2974,7 @@
           <a:p>
             <a:fld id="{4F6C27C5-5812-4AB4-AA99-BFA1A6532403}" type="datetime1">
               <a:rPr lang="en-US" smtClean="0"/>
-              <a:t>3/23/2023</a:t>
+              <a:t>3/24/2023</a:t>
             </a:fld>
             <a:endParaRPr lang="en-US"/>
           </a:p>
@@ -3033,7 +3118,7 @@
           <a:p>
             <a:fld id="{01E17CC1-43C0-45B8-AB30-B4F1979189AC}" type="datetime1">
               <a:rPr lang="en-US" smtClean="0"/>
-              <a:t>3/23/2023</a:t>
+              <a:t>3/24/2023</a:t>
             </a:fld>
             <a:endParaRPr lang="en-US"/>
           </a:p>
@@ -3149,7 +3234,7 @@
           <a:p>
             <a:fld id="{86720E5C-818F-46A2-A674-ACF0EF433E2C}" type="datetime1">
               <a:rPr lang="en-US" smtClean="0"/>
-              <a:t>3/23/2023</a:t>
+              <a:t>3/24/2023</a:t>
             </a:fld>
             <a:endParaRPr lang="en-US"/>
           </a:p>
@@ -3463,7 +3548,7 @@
           <a:p>
             <a:fld id="{3BF26B5B-FDE8-4DDB-82A7-BEF41002D93B}" type="datetime1">
               <a:rPr lang="en-US" smtClean="0"/>
-              <a:t>3/23/2023</a:t>
+              <a:t>3/24/2023</a:t>
             </a:fld>
             <a:endParaRPr lang="en-US"/>
           </a:p>
@@ -3754,7 +3839,7 @@
           <a:p>
             <a:fld id="{5CC07EE6-18E8-48EE-9715-5838292A3776}" type="datetime1">
               <a:rPr lang="en-US" smtClean="0"/>
-              <a:t>3/23/2023</a:t>
+              <a:t>3/24/2023</a:t>
             </a:fld>
             <a:endParaRPr lang="en-US"/>
           </a:p>
@@ -3998,7 +4083,7 @@
           <a:p>
             <a:fld id="{9025BCED-13F6-41CB-8B3C-875C16F6C384}" type="datetime1">
               <a:rPr lang="en-US" smtClean="0"/>
-              <a:t>3/23/2023</a:t>
+              <a:t>3/24/2023</a:t>
             </a:fld>
             <a:endParaRPr lang="en-US"/>
           </a:p>
@@ -4994,6 +5079,151 @@
       </p:grpSpPr>
       <p:sp>
         <p:nvSpPr>
+          <p:cNvPr id="2" name="Title 1">
+            <a:extLst>
+              <a:ext uri="{FF2B5EF4-FFF2-40B4-BE49-F238E27FC236}">
+                <a16:creationId xmlns:a16="http://schemas.microsoft.com/office/drawing/2014/main" id="{EB3E31FD-1C2F-48A6-AB51-148D4276F8C0}"/>
+              </a:ext>
+            </a:extLst>
+          </p:cNvPr>
+          <p:cNvSpPr>
+            <a:spLocks noGrp="1"/>
+          </p:cNvSpPr>
+          <p:nvPr>
+            <p:ph type="title"/>
+          </p:nvPr>
+        </p:nvSpPr>
+        <p:spPr>
+          <a:xfrm>
+            <a:off x="286327" y="365125"/>
+            <a:ext cx="11693237" cy="1325563"/>
+          </a:xfrm>
+        </p:spPr>
+        <p:txBody>
+          <a:bodyPr/>
+          <a:lstStyle/>
+          <a:p>
+            <a:r>
+              <a:rPr lang="en-US" dirty="0"/>
+              <a:t>Next Steps</a:t>
+            </a:r>
+          </a:p>
+        </p:txBody>
+      </p:sp>
+      <p:sp>
+        <p:nvSpPr>
+          <p:cNvPr id="5" name="Content Placeholder 4">
+            <a:extLst>
+              <a:ext uri="{FF2B5EF4-FFF2-40B4-BE49-F238E27FC236}">
+                <a16:creationId xmlns:a16="http://schemas.microsoft.com/office/drawing/2014/main" id="{2E902790-AB44-4F74-A53E-22411B711C79}"/>
+              </a:ext>
+            </a:extLst>
+          </p:cNvPr>
+          <p:cNvSpPr>
+            <a:spLocks noGrp="1"/>
+          </p:cNvSpPr>
+          <p:nvPr>
+            <p:ph idx="1"/>
+          </p:nvPr>
+        </p:nvSpPr>
+        <p:spPr/>
+        <p:txBody>
+          <a:bodyPr>
+            <a:normAutofit/>
+          </a:bodyPr>
+          <a:lstStyle/>
+          <a:p>
+            <a:r>
+              <a:rPr lang="en-US" dirty="0"/>
+              <a:t>Request for WG adoption</a:t>
+            </a:r>
+          </a:p>
+          <a:p>
+            <a:r>
+              <a:rPr lang="en-US" dirty="0"/>
+              <a:t>Resolve open issues</a:t>
+            </a:r>
+          </a:p>
+          <a:p>
+            <a:endParaRPr lang="en-US" dirty="0"/>
+          </a:p>
+          <a:p>
+            <a:endParaRPr lang="en-US" dirty="0">
+              <a:highlight>
+                <a:srgbClr val="FFFF00"/>
+              </a:highlight>
+            </a:endParaRPr>
+          </a:p>
+          <a:p>
+            <a:pPr marL="0" indent="0">
+              <a:buNone/>
+            </a:pPr>
+            <a:r>
+              <a:rPr lang="en-US" dirty="0"/>
+              <a:t>* GitHub Repo</a:t>
+            </a:r>
+          </a:p>
+          <a:p>
+            <a:pPr marL="457200" lvl="1" indent="0">
+              <a:buNone/>
+            </a:pPr>
+            <a:r>
+              <a:rPr lang="en-US" dirty="0">
+                <a:hlinkClick r:id="rId3"/>
+              </a:rPr>
+              <a:t>https://github.com/aguoietf/ietf-network-slice-topology</a:t>
+            </a:r>
+            <a:endParaRPr lang="en-US" dirty="0"/>
+          </a:p>
+          <a:p>
+            <a:pPr marL="457200" lvl="1" indent="0">
+              <a:buNone/>
+            </a:pPr>
+            <a:endParaRPr lang="en-US" dirty="0"/>
+          </a:p>
+          <a:p>
+            <a:pPr marL="457200" lvl="1" indent="0">
+              <a:buNone/>
+            </a:pPr>
+            <a:endParaRPr lang="en-US" dirty="0"/>
+          </a:p>
+          <a:p>
+            <a:endParaRPr lang="en-US" dirty="0"/>
+          </a:p>
+        </p:txBody>
+      </p:sp>
+    </p:spTree>
+    <p:extLst>
+      <p:ext uri="{BB962C8B-B14F-4D97-AF65-F5344CB8AC3E}">
+        <p14:creationId xmlns:p14="http://schemas.microsoft.com/office/powerpoint/2010/main" val="2009935748"/>
+      </p:ext>
+    </p:extLst>
+  </p:cSld>
+  <p:clrMapOvr>
+    <a:masterClrMapping/>
+  </p:clrMapOvr>
+</p:sld>
+</file>
+
+<file path=ppt/slides/slide11.xml><?xml version="1.0" encoding="utf-8"?>
+<p:sld xmlns:a="http://schemas.openxmlformats.org/drawingml/2006/main" xmlns:r="http://schemas.openxmlformats.org/officeDocument/2006/relationships" xmlns:p="http://schemas.openxmlformats.org/presentationml/2006/main">
+  <p:cSld>
+    <p:spTree>
+      <p:nvGrpSpPr>
+        <p:cNvPr id="1" name=""/>
+        <p:cNvGrpSpPr/>
+        <p:nvPr/>
+      </p:nvGrpSpPr>
+      <p:grpSpPr>
+        <a:xfrm>
+          <a:off x="0" y="0"/>
+          <a:ext cx="0" cy="0"/>
+          <a:chOff x="0" y="0"/>
+          <a:chExt cx="0" cy="0"/>
+        </a:xfrm>
+      </p:grpSpPr>
+      <p:sp>
+        <p:nvSpPr>
           <p:cNvPr id="4" name="标题 4"/>
           <p:cNvSpPr txBox="1"/>
           <p:nvPr/>
@@ -6162,38 +6392,10 @@
         </p:nvSpPr>
         <p:spPr>
           <a:xfrm>
-            <a:off x="286327" y="365125"/>
-            <a:ext cx="11693237" cy="1325563"/>
+            <a:off x="838200" y="365125"/>
+            <a:ext cx="10986856" cy="1325563"/>
           </a:xfrm>
         </p:spPr>
-        <p:txBody>
-          <a:bodyPr/>
-          <a:lstStyle/>
-          <a:p>
-            <a:r>
-              <a:rPr lang="en-US" dirty="0"/>
-              <a:t>Next Steps</a:t>
-            </a:r>
-          </a:p>
-        </p:txBody>
-      </p:sp>
-      <p:sp>
-        <p:nvSpPr>
-          <p:cNvPr id="5" name="Content Placeholder 4">
-            <a:extLst>
-              <a:ext uri="{FF2B5EF4-FFF2-40B4-BE49-F238E27FC236}">
-                <a16:creationId xmlns:a16="http://schemas.microsoft.com/office/drawing/2014/main" id="{2E902790-AB44-4F74-A53E-22411B711C79}"/>
-              </a:ext>
-            </a:extLst>
-          </p:cNvPr>
-          <p:cNvSpPr>
-            <a:spLocks noGrp="1"/>
-          </p:cNvSpPr>
-          <p:nvPr>
-            <p:ph idx="1"/>
-          </p:nvPr>
-        </p:nvSpPr>
-        <p:spPr/>
         <p:txBody>
           <a:bodyPr>
             <a:normAutofit/>
@@ -6201,68 +6403,753 @@
           <a:lstStyle/>
           <a:p>
             <a:r>
-              <a:rPr lang="en-US" dirty="0"/>
-              <a:t>Request for WG adoption</a:t>
-            </a:r>
-          </a:p>
-          <a:p>
-            <a:r>
-              <a:rPr lang="en-US" dirty="0"/>
-              <a:t>Resolve open issues</a:t>
-            </a:r>
-          </a:p>
-          <a:p>
-            <a:endParaRPr lang="en-US" dirty="0"/>
-          </a:p>
-          <a:p>
-            <a:endParaRPr lang="en-US" dirty="0">
-              <a:highlight>
-                <a:srgbClr val="FFFF00"/>
-              </a:highlight>
+              <a:rPr lang="en-US" sz="4000" dirty="0"/>
+              <a:t>Open Issue – Relationship between SDP and LTP</a:t>
+            </a:r>
+          </a:p>
+        </p:txBody>
+      </p:sp>
+      <p:sp>
+        <p:nvSpPr>
+          <p:cNvPr id="6" name="Content Placeholder 5">
+            <a:extLst>
+              <a:ext uri="{FF2B5EF4-FFF2-40B4-BE49-F238E27FC236}">
+                <a16:creationId xmlns:a16="http://schemas.microsoft.com/office/drawing/2014/main" id="{05BF5329-997E-2121-E048-C9F3687C5A67}"/>
+              </a:ext>
+            </a:extLst>
+          </p:cNvPr>
+          <p:cNvSpPr>
+            <a:spLocks noGrp="1"/>
+          </p:cNvSpPr>
+          <p:nvPr>
+            <p:ph idx="1"/>
+          </p:nvPr>
+        </p:nvSpPr>
+        <p:spPr>
+          <a:xfrm>
+            <a:off x="838200" y="1571946"/>
+            <a:ext cx="10658383" cy="4605017"/>
+          </a:xfrm>
+        </p:spPr>
+        <p:txBody>
+          <a:bodyPr>
+            <a:normAutofit fontScale="92500" lnSpcReduction="20000"/>
+          </a:bodyPr>
+          <a:lstStyle/>
+          <a:p>
+            <a:r>
+              <a:rPr lang="en-US" sz="2000" dirty="0"/>
+              <a:t>Current NS NBI model defines an SDP to reference an LTP object</a:t>
+            </a:r>
+          </a:p>
+          <a:p>
+            <a:pPr marL="457200" lvl="1" indent="0">
+              <a:buNone/>
+            </a:pPr>
+            <a:r>
+              <a:rPr lang="en-US" sz="1300" b="0" i="0" dirty="0">
+                <a:solidFill>
+                  <a:srgbClr val="000000"/>
+                </a:solidFill>
+                <a:effectLst/>
+                <a:latin typeface="Courier New" panose="02070309020205020404" pitchFamily="49" charset="0"/>
+              </a:rPr>
+              <a:t>+--</a:t>
+            </a:r>
+            <a:r>
+              <a:rPr lang="en-US" sz="1300" b="0" i="0" dirty="0" err="1">
+                <a:solidFill>
+                  <a:srgbClr val="000000"/>
+                </a:solidFill>
+                <a:effectLst/>
+                <a:latin typeface="Courier New" panose="02070309020205020404" pitchFamily="49" charset="0"/>
+              </a:rPr>
+              <a:t>rw</a:t>
+            </a:r>
+            <a:r>
+              <a:rPr lang="en-US" sz="1300" b="0" i="0" dirty="0">
+                <a:solidFill>
+                  <a:srgbClr val="000000"/>
+                </a:solidFill>
+                <a:effectLst/>
+                <a:latin typeface="Courier New" panose="02070309020205020404" pitchFamily="49" charset="0"/>
+              </a:rPr>
+              <a:t> </a:t>
+            </a:r>
+            <a:r>
+              <a:rPr lang="en-US" sz="1300" b="0" i="0" dirty="0" err="1">
+                <a:solidFill>
+                  <a:srgbClr val="000000"/>
+                </a:solidFill>
+                <a:effectLst/>
+                <a:latin typeface="Courier New" panose="02070309020205020404" pitchFamily="49" charset="0"/>
+              </a:rPr>
+              <a:t>sdps</a:t>
+            </a:r>
+            <a:endParaRPr lang="en-US" sz="1300" b="0" i="0" dirty="0">
+              <a:solidFill>
+                <a:srgbClr val="000000"/>
+              </a:solidFill>
+              <a:effectLst/>
+              <a:latin typeface="Courier New" panose="02070309020205020404" pitchFamily="49" charset="0"/>
             </a:endParaRPr>
           </a:p>
           <a:p>
+            <a:pPr marL="457200" lvl="1" indent="0">
+              <a:buNone/>
+            </a:pPr>
+            <a:r>
+              <a:rPr lang="en-US" sz="1500" b="0" i="0" dirty="0">
+                <a:solidFill>
+                  <a:srgbClr val="000000"/>
+                </a:solidFill>
+                <a:effectLst/>
+                <a:latin typeface="Courier New" panose="02070309020205020404" pitchFamily="49" charset="0"/>
+              </a:rPr>
+              <a:t>  +--</a:t>
+            </a:r>
+            <a:r>
+              <a:rPr lang="en-US" sz="1500" b="0" i="0" dirty="0" err="1">
+                <a:solidFill>
+                  <a:srgbClr val="000000"/>
+                </a:solidFill>
+                <a:effectLst/>
+                <a:latin typeface="Courier New" panose="02070309020205020404" pitchFamily="49" charset="0"/>
+              </a:rPr>
+              <a:t>rw</a:t>
+            </a:r>
+            <a:r>
+              <a:rPr lang="en-US" sz="1500" b="0" i="0" dirty="0">
+                <a:solidFill>
+                  <a:srgbClr val="000000"/>
+                </a:solidFill>
+                <a:effectLst/>
+                <a:latin typeface="Courier New" panose="02070309020205020404" pitchFamily="49" charset="0"/>
+              </a:rPr>
+              <a:t> </a:t>
+            </a:r>
+            <a:r>
+              <a:rPr lang="en-US" sz="1500" b="0" i="0" dirty="0" err="1">
+                <a:solidFill>
+                  <a:srgbClr val="000000"/>
+                </a:solidFill>
+                <a:effectLst/>
+                <a:latin typeface="Courier New" panose="02070309020205020404" pitchFamily="49" charset="0"/>
+              </a:rPr>
+              <a:t>sdp</a:t>
+            </a:r>
+            <a:r>
+              <a:rPr lang="en-US" sz="1500" b="0" i="0" dirty="0">
+                <a:solidFill>
+                  <a:srgbClr val="000000"/>
+                </a:solidFill>
+                <a:effectLst/>
+                <a:latin typeface="Courier New" panose="02070309020205020404" pitchFamily="49" charset="0"/>
+              </a:rPr>
+              <a:t>* [id]</a:t>
+            </a:r>
+          </a:p>
+          <a:p>
+            <a:pPr marL="457200" lvl="1" indent="0">
+              <a:buNone/>
+            </a:pPr>
+            <a:r>
+              <a:rPr lang="en-US" sz="1500" b="0" i="0" dirty="0">
+                <a:solidFill>
+                  <a:srgbClr val="000000"/>
+                </a:solidFill>
+                <a:effectLst/>
+                <a:latin typeface="Courier New" panose="02070309020205020404" pitchFamily="49" charset="0"/>
+              </a:rPr>
+              <a:t>     +--</a:t>
+            </a:r>
+            <a:r>
+              <a:rPr lang="en-US" sz="1500" b="0" i="0" dirty="0" err="1">
+                <a:solidFill>
+                  <a:srgbClr val="000000"/>
+                </a:solidFill>
+                <a:effectLst/>
+                <a:latin typeface="Courier New" panose="02070309020205020404" pitchFamily="49" charset="0"/>
+              </a:rPr>
+              <a:t>rw</a:t>
+            </a:r>
+            <a:r>
+              <a:rPr lang="en-US" sz="1500" b="0" i="0" dirty="0">
+                <a:solidFill>
+                  <a:srgbClr val="000000"/>
+                </a:solidFill>
+                <a:effectLst/>
+                <a:latin typeface="Courier New" panose="02070309020205020404" pitchFamily="49" charset="0"/>
+              </a:rPr>
+              <a:t> id                        string</a:t>
+            </a:r>
+          </a:p>
+          <a:p>
+            <a:pPr marL="457200" lvl="1" indent="0">
+              <a:buNone/>
+            </a:pPr>
+            <a:r>
+              <a:rPr lang="en-US" sz="1500" b="0" i="0" dirty="0">
+                <a:solidFill>
+                  <a:srgbClr val="000000"/>
+                </a:solidFill>
+                <a:effectLst/>
+                <a:latin typeface="Courier New" panose="02070309020205020404" pitchFamily="49" charset="0"/>
+              </a:rPr>
+              <a:t>     +--</a:t>
+            </a:r>
+            <a:r>
+              <a:rPr lang="en-US" sz="1500" b="0" i="0" dirty="0" err="1">
+                <a:solidFill>
+                  <a:srgbClr val="000000"/>
+                </a:solidFill>
+                <a:effectLst/>
+                <a:latin typeface="Courier New" panose="02070309020205020404" pitchFamily="49" charset="0"/>
+              </a:rPr>
+              <a:t>rw</a:t>
+            </a:r>
+            <a:r>
+              <a:rPr lang="en-US" sz="1500" b="0" i="0" dirty="0">
+                <a:solidFill>
+                  <a:srgbClr val="000000"/>
+                </a:solidFill>
+                <a:effectLst/>
+                <a:latin typeface="Courier New" panose="02070309020205020404" pitchFamily="49" charset="0"/>
+              </a:rPr>
+              <a:t> description?              string</a:t>
+            </a:r>
+          </a:p>
+          <a:p>
+            <a:pPr marL="457200" lvl="1" indent="0">
+              <a:buNone/>
+            </a:pPr>
+            <a:r>
+              <a:rPr lang="en-US" sz="1500" b="0" i="0" dirty="0">
+                <a:solidFill>
+                  <a:srgbClr val="000000"/>
+                </a:solidFill>
+                <a:effectLst/>
+                <a:latin typeface="Courier New" panose="02070309020205020404" pitchFamily="49" charset="0"/>
+              </a:rPr>
+              <a:t>     +--</a:t>
+            </a:r>
+            <a:r>
+              <a:rPr lang="en-US" sz="1500" b="0" i="0" dirty="0" err="1">
+                <a:solidFill>
+                  <a:srgbClr val="000000"/>
+                </a:solidFill>
+                <a:effectLst/>
+                <a:latin typeface="Courier New" panose="02070309020205020404" pitchFamily="49" charset="0"/>
+              </a:rPr>
+              <a:t>rw</a:t>
+            </a:r>
+            <a:r>
+              <a:rPr lang="en-US" sz="1500" b="0" i="0" dirty="0">
+                <a:solidFill>
+                  <a:srgbClr val="000000"/>
+                </a:solidFill>
+                <a:effectLst/>
+                <a:latin typeface="Courier New" panose="02070309020205020404" pitchFamily="49" charset="0"/>
+              </a:rPr>
+              <a:t> location</a:t>
+            </a:r>
+          </a:p>
+          <a:p>
+            <a:pPr marL="457200" lvl="1" indent="0">
+              <a:buNone/>
+            </a:pPr>
+            <a:r>
+              <a:rPr lang="en-US" sz="1500" b="0" i="0" dirty="0">
+                <a:solidFill>
+                  <a:srgbClr val="000000"/>
+                </a:solidFill>
+                <a:effectLst/>
+                <a:latin typeface="Courier New" panose="02070309020205020404" pitchFamily="49" charset="0"/>
+              </a:rPr>
+              <a:t>     |     ...</a:t>
+            </a:r>
+          </a:p>
+          <a:p>
+            <a:pPr marL="457200" lvl="1" indent="0">
+              <a:buNone/>
+            </a:pPr>
+            <a:r>
+              <a:rPr lang="en-US" sz="1500" b="0" i="0" dirty="0">
+                <a:solidFill>
+                  <a:srgbClr val="000000"/>
+                </a:solidFill>
+                <a:effectLst/>
+                <a:latin typeface="Courier New" panose="02070309020205020404" pitchFamily="49" charset="0"/>
+              </a:rPr>
+              <a:t>     +--</a:t>
+            </a:r>
+            <a:r>
+              <a:rPr lang="en-US" sz="1500" b="0" i="0" dirty="0" err="1">
+                <a:solidFill>
+                  <a:srgbClr val="000000"/>
+                </a:solidFill>
+                <a:effectLst/>
+                <a:latin typeface="Courier New" panose="02070309020205020404" pitchFamily="49" charset="0"/>
+              </a:rPr>
+              <a:t>rw</a:t>
+            </a:r>
+            <a:r>
+              <a:rPr lang="en-US" sz="1500" b="0" i="0" dirty="0">
+                <a:solidFill>
+                  <a:srgbClr val="000000"/>
+                </a:solidFill>
+                <a:effectLst/>
+                <a:latin typeface="Courier New" panose="02070309020205020404" pitchFamily="49" charset="0"/>
+              </a:rPr>
+              <a:t> node-id?                  string</a:t>
+            </a:r>
+          </a:p>
+          <a:p>
+            <a:pPr marL="457200" lvl="1" indent="0">
+              <a:buNone/>
+            </a:pPr>
+            <a:r>
+              <a:rPr lang="en-US" sz="1500" b="0" i="0" dirty="0">
+                <a:solidFill>
+                  <a:srgbClr val="000000"/>
+                </a:solidFill>
+                <a:effectLst/>
+                <a:latin typeface="Courier New" panose="02070309020205020404" pitchFamily="49" charset="0"/>
+              </a:rPr>
+              <a:t>     +--</a:t>
+            </a:r>
+            <a:r>
+              <a:rPr lang="en-US" sz="1500" b="0" i="0" dirty="0" err="1">
+                <a:solidFill>
+                  <a:srgbClr val="000000"/>
+                </a:solidFill>
+                <a:effectLst/>
+                <a:latin typeface="Courier New" panose="02070309020205020404" pitchFamily="49" charset="0"/>
+              </a:rPr>
+              <a:t>rw</a:t>
+            </a:r>
+            <a:r>
+              <a:rPr lang="en-US" sz="1500" b="0" i="0" dirty="0">
+                <a:solidFill>
+                  <a:srgbClr val="000000"/>
+                </a:solidFill>
+                <a:effectLst/>
+                <a:latin typeface="Courier New" panose="02070309020205020404" pitchFamily="49" charset="0"/>
+              </a:rPr>
+              <a:t> </a:t>
+            </a:r>
+            <a:r>
+              <a:rPr lang="en-US" sz="1500" b="0" i="0" dirty="0" err="1">
+                <a:solidFill>
+                  <a:srgbClr val="000000"/>
+                </a:solidFill>
+                <a:effectLst/>
+                <a:latin typeface="Courier New" panose="02070309020205020404" pitchFamily="49" charset="0"/>
+              </a:rPr>
+              <a:t>sdp</a:t>
+            </a:r>
+            <a:r>
+              <a:rPr lang="en-US" sz="1500" b="0" i="0" dirty="0">
+                <a:solidFill>
+                  <a:srgbClr val="000000"/>
+                </a:solidFill>
+                <a:effectLst/>
+                <a:latin typeface="Courier New" panose="02070309020205020404" pitchFamily="49" charset="0"/>
+              </a:rPr>
+              <a:t>-</a:t>
+            </a:r>
+            <a:r>
+              <a:rPr lang="en-US" sz="1500" b="0" i="0" dirty="0" err="1">
+                <a:solidFill>
+                  <a:srgbClr val="000000"/>
+                </a:solidFill>
+                <a:effectLst/>
+                <a:latin typeface="Courier New" panose="02070309020205020404" pitchFamily="49" charset="0"/>
+              </a:rPr>
+              <a:t>ip</a:t>
+            </a:r>
+            <a:r>
+              <a:rPr lang="en-US" sz="1500" b="0" i="0" dirty="0">
+                <a:solidFill>
+                  <a:srgbClr val="000000"/>
+                </a:solidFill>
+                <a:effectLst/>
+                <a:latin typeface="Courier New" panose="02070309020205020404" pitchFamily="49" charset="0"/>
+              </a:rPr>
+              <a:t>-address*           </a:t>
+            </a:r>
+            <a:r>
+              <a:rPr lang="en-US" sz="1500" b="0" i="0" dirty="0" err="1">
+                <a:solidFill>
+                  <a:srgbClr val="000000"/>
+                </a:solidFill>
+                <a:effectLst/>
+                <a:latin typeface="Courier New" panose="02070309020205020404" pitchFamily="49" charset="0"/>
+              </a:rPr>
+              <a:t>inet:ip-address</a:t>
+            </a:r>
+            <a:endParaRPr lang="en-US" sz="1500" b="0" i="0" dirty="0">
+              <a:solidFill>
+                <a:srgbClr val="000000"/>
+              </a:solidFill>
+              <a:effectLst/>
+              <a:latin typeface="Courier New" panose="02070309020205020404" pitchFamily="49" charset="0"/>
+            </a:endParaRPr>
+          </a:p>
+          <a:p>
+            <a:pPr marL="457200" lvl="1" indent="0">
+              <a:buNone/>
+            </a:pPr>
+            <a:r>
+              <a:rPr lang="en-US" sz="1500" b="0" i="0" dirty="0">
+                <a:solidFill>
+                  <a:srgbClr val="000000"/>
+                </a:solidFill>
+                <a:effectLst/>
+                <a:latin typeface="Courier New" panose="02070309020205020404" pitchFamily="49" charset="0"/>
+              </a:rPr>
+              <a:t>     +--</a:t>
+            </a:r>
+            <a:r>
+              <a:rPr lang="en-US" sz="1500" b="0" i="0" dirty="0" err="1">
+                <a:solidFill>
+                  <a:srgbClr val="000000"/>
+                </a:solidFill>
+                <a:effectLst/>
+                <a:latin typeface="Courier New" panose="02070309020205020404" pitchFamily="49" charset="0"/>
+              </a:rPr>
+              <a:t>rw</a:t>
+            </a:r>
+            <a:r>
+              <a:rPr lang="en-US" sz="1500" b="0" i="0" dirty="0">
+                <a:solidFill>
+                  <a:srgbClr val="000000"/>
+                </a:solidFill>
+                <a:effectLst/>
+                <a:latin typeface="Courier New" panose="02070309020205020404" pitchFamily="49" charset="0"/>
+              </a:rPr>
+              <a:t> </a:t>
+            </a:r>
+            <a:r>
+              <a:rPr lang="en-US" sz="1500" b="0" i="0" dirty="0" err="1">
+                <a:solidFill>
+                  <a:srgbClr val="000000"/>
+                </a:solidFill>
+                <a:effectLst/>
+                <a:latin typeface="Courier New" panose="02070309020205020404" pitchFamily="49" charset="0"/>
+              </a:rPr>
+              <a:t>tp</a:t>
+            </a:r>
+            <a:r>
+              <a:rPr lang="en-US" sz="1500" b="0" i="0" dirty="0">
+                <a:solidFill>
+                  <a:srgbClr val="000000"/>
+                </a:solidFill>
+                <a:effectLst/>
+                <a:latin typeface="Courier New" panose="02070309020205020404" pitchFamily="49" charset="0"/>
+              </a:rPr>
+              <a:t>-ref?                   -&gt; /</a:t>
+            </a:r>
+            <a:r>
+              <a:rPr lang="en-US" sz="1500" b="0" i="0" dirty="0" err="1">
+                <a:solidFill>
+                  <a:srgbClr val="000000"/>
+                </a:solidFill>
+                <a:effectLst/>
+                <a:latin typeface="Courier New" panose="02070309020205020404" pitchFamily="49" charset="0"/>
+              </a:rPr>
+              <a:t>nw:networks</a:t>
+            </a:r>
+            <a:r>
+              <a:rPr lang="en-US" sz="1500" b="0" i="0" dirty="0">
+                <a:solidFill>
+                  <a:srgbClr val="000000"/>
+                </a:solidFill>
+                <a:effectLst/>
+                <a:latin typeface="Courier New" panose="02070309020205020404" pitchFamily="49" charset="0"/>
+              </a:rPr>
+              <a:t>/network[</a:t>
+            </a:r>
+            <a:r>
+              <a:rPr lang="en-US" sz="1500" b="0" i="0" dirty="0" err="1">
+                <a:solidFill>
+                  <a:srgbClr val="000000"/>
+                </a:solidFill>
+                <a:effectLst/>
+                <a:latin typeface="Courier New" panose="02070309020205020404" pitchFamily="49" charset="0"/>
+              </a:rPr>
+              <a:t>nw:network-id</a:t>
+            </a:r>
+            <a:r>
+              <a:rPr lang="en-US" sz="1500" b="0" i="0" dirty="0">
+                <a:solidFill>
+                  <a:srgbClr val="000000"/>
+                </a:solidFill>
+                <a:effectLst/>
+                <a:latin typeface="Courier New" panose="02070309020205020404" pitchFamily="49" charset="0"/>
+              </a:rPr>
+              <a:t> =current()/../../../custom-topology-ref/network-ref]/node/</a:t>
+            </a:r>
+            <a:r>
+              <a:rPr lang="en-US" sz="1500" b="0" i="0" dirty="0" err="1">
+                <a:solidFill>
+                  <a:srgbClr val="000000"/>
+                </a:solidFill>
+                <a:effectLst/>
+                <a:latin typeface="Courier New" panose="02070309020205020404" pitchFamily="49" charset="0"/>
+              </a:rPr>
+              <a:t>nt:termination-point</a:t>
+            </a:r>
+            <a:r>
+              <a:rPr lang="en-US" sz="1500" b="0" i="0" dirty="0">
+                <a:solidFill>
+                  <a:srgbClr val="000000"/>
+                </a:solidFill>
+                <a:effectLst/>
+                <a:latin typeface="Courier New" panose="02070309020205020404" pitchFamily="49" charset="0"/>
+              </a:rPr>
+              <a:t>/</a:t>
+            </a:r>
+            <a:r>
+              <a:rPr lang="en-US" sz="1500" b="0" i="0" dirty="0" err="1">
+                <a:solidFill>
+                  <a:srgbClr val="000000"/>
+                </a:solidFill>
+                <a:effectLst/>
+                <a:latin typeface="Courier New" panose="02070309020205020404" pitchFamily="49" charset="0"/>
+              </a:rPr>
+              <a:t>tp</a:t>
+            </a:r>
+            <a:r>
+              <a:rPr lang="en-US" sz="1500" b="0" i="0" dirty="0">
+                <a:solidFill>
+                  <a:srgbClr val="000000"/>
+                </a:solidFill>
+                <a:effectLst/>
+                <a:latin typeface="Courier New" panose="02070309020205020404" pitchFamily="49" charset="0"/>
+              </a:rPr>
+              <a:t>-id</a:t>
+            </a:r>
+          </a:p>
+          <a:p>
+            <a:endParaRPr lang="en-US" sz="2000" dirty="0"/>
+          </a:p>
+          <a:p>
+            <a:r>
+              <a:rPr lang="en-US" sz="2000" dirty="0"/>
+              <a:t>Should the reference be the other way around, </a:t>
+            </a:r>
+            <a:r>
+              <a:rPr lang="en-US" sz="2000" dirty="0" err="1"/>
+              <a:t>i.g.</a:t>
+            </a:r>
+            <a:r>
+              <a:rPr lang="en-US" sz="2000" dirty="0"/>
+              <a:t> an LTP object to reference an SDP? </a:t>
+            </a:r>
+          </a:p>
+          <a:p>
             <a:pPr marL="0" indent="0">
               <a:buNone/>
             </a:pPr>
             <a:r>
-              <a:rPr lang="en-US" dirty="0"/>
-              <a:t>* GitHub Repo</a:t>
-            </a:r>
+              <a:rPr lang="en-US" sz="1500" dirty="0">
+                <a:solidFill>
+                  <a:srgbClr val="000000"/>
+                </a:solidFill>
+                <a:latin typeface="Courier New" panose="02070309020205020404" pitchFamily="49" charset="0"/>
+              </a:rPr>
+              <a:t>      augment /</a:t>
+            </a:r>
+            <a:r>
+              <a:rPr lang="en-US" sz="1500" dirty="0" err="1">
+                <a:solidFill>
+                  <a:srgbClr val="000000"/>
+                </a:solidFill>
+                <a:latin typeface="Courier New" panose="02070309020205020404" pitchFamily="49" charset="0"/>
+              </a:rPr>
+              <a:t>nw:networks</a:t>
+            </a:r>
+            <a:r>
+              <a:rPr lang="en-US" sz="1500" dirty="0">
+                <a:solidFill>
+                  <a:srgbClr val="000000"/>
+                </a:solidFill>
+                <a:latin typeface="Courier New" panose="02070309020205020404" pitchFamily="49" charset="0"/>
+              </a:rPr>
+              <a:t>/</a:t>
+            </a:r>
+            <a:r>
+              <a:rPr lang="en-US" sz="1500" dirty="0" err="1">
+                <a:solidFill>
+                  <a:srgbClr val="000000"/>
+                </a:solidFill>
+                <a:latin typeface="Courier New" panose="02070309020205020404" pitchFamily="49" charset="0"/>
+              </a:rPr>
+              <a:t>nw:network</a:t>
+            </a:r>
+            <a:r>
+              <a:rPr lang="en-US" sz="1500" dirty="0">
+                <a:solidFill>
+                  <a:srgbClr val="000000"/>
+                </a:solidFill>
+                <a:latin typeface="Courier New" panose="02070309020205020404" pitchFamily="49" charset="0"/>
+              </a:rPr>
+              <a:t>/</a:t>
+            </a:r>
+            <a:r>
+              <a:rPr lang="en-US" sz="1500" dirty="0" err="1">
+                <a:solidFill>
+                  <a:srgbClr val="000000"/>
+                </a:solidFill>
+                <a:latin typeface="Courier New" panose="02070309020205020404" pitchFamily="49" charset="0"/>
+              </a:rPr>
+              <a:t>nw:node</a:t>
+            </a:r>
+            <a:r>
+              <a:rPr lang="en-US" sz="1500" dirty="0">
+                <a:solidFill>
+                  <a:srgbClr val="000000"/>
+                </a:solidFill>
+                <a:latin typeface="Courier New" panose="02070309020205020404" pitchFamily="49" charset="0"/>
+              </a:rPr>
+              <a:t>/</a:t>
+            </a:r>
+            <a:r>
+              <a:rPr lang="en-US" sz="1500" dirty="0" err="1">
+                <a:solidFill>
+                  <a:srgbClr val="000000"/>
+                </a:solidFill>
+                <a:latin typeface="Courier New" panose="02070309020205020404" pitchFamily="49" charset="0"/>
+              </a:rPr>
+              <a:t>nt:termination-point</a:t>
+            </a:r>
+            <a:r>
+              <a:rPr lang="en-US" sz="1500" dirty="0">
+                <a:solidFill>
+                  <a:srgbClr val="000000"/>
+                </a:solidFill>
+                <a:latin typeface="Courier New" panose="02070309020205020404" pitchFamily="49" charset="0"/>
+              </a:rPr>
+              <a:t>:    </a:t>
+            </a:r>
+          </a:p>
+          <a:p>
+            <a:pPr marL="0" indent="0">
+              <a:buNone/>
+            </a:pPr>
+            <a:r>
+              <a:rPr lang="en-US" sz="1500" dirty="0">
+                <a:solidFill>
+                  <a:srgbClr val="000000"/>
+                </a:solidFill>
+                <a:latin typeface="Courier New" panose="02070309020205020404" pitchFamily="49" charset="0"/>
+              </a:rPr>
+              <a:t>        +--</a:t>
+            </a:r>
+            <a:r>
+              <a:rPr lang="en-US" sz="1500" dirty="0" err="1">
+                <a:solidFill>
+                  <a:srgbClr val="000000"/>
+                </a:solidFill>
+                <a:latin typeface="Courier New" panose="02070309020205020404" pitchFamily="49" charset="0"/>
+              </a:rPr>
+              <a:t>rw</a:t>
+            </a:r>
+            <a:r>
+              <a:rPr lang="en-US" sz="1500" dirty="0">
+                <a:solidFill>
+                  <a:srgbClr val="000000"/>
+                </a:solidFill>
+                <a:latin typeface="Courier New" panose="02070309020205020404" pitchFamily="49" charset="0"/>
+              </a:rPr>
+              <a:t> customer-facing-</a:t>
+            </a:r>
+            <a:r>
+              <a:rPr lang="en-US" sz="1500" dirty="0" err="1">
+                <a:solidFill>
+                  <a:srgbClr val="000000"/>
+                </a:solidFill>
+                <a:latin typeface="Courier New" panose="02070309020205020404" pitchFamily="49" charset="0"/>
+              </a:rPr>
+              <a:t>sdp</a:t>
+            </a:r>
+            <a:r>
+              <a:rPr lang="en-US" sz="1500" dirty="0">
+                <a:solidFill>
+                  <a:srgbClr val="000000"/>
+                </a:solidFill>
+                <a:latin typeface="Courier New" panose="02070309020205020404" pitchFamily="49" charset="0"/>
+              </a:rPr>
+              <a:t>-id?         </a:t>
+            </a:r>
+            <a:r>
+              <a:rPr lang="en-US" sz="1500" dirty="0" err="1">
+                <a:solidFill>
+                  <a:srgbClr val="000000"/>
+                </a:solidFill>
+                <a:latin typeface="Courier New" panose="02070309020205020404" pitchFamily="49" charset="0"/>
+              </a:rPr>
+              <a:t>Leafref</a:t>
+            </a:r>
+            <a:endParaRPr lang="en-US" sz="1500" dirty="0">
+              <a:solidFill>
+                <a:srgbClr val="000000"/>
+              </a:solidFill>
+              <a:latin typeface="Courier New" panose="02070309020205020404" pitchFamily="49" charset="0"/>
+            </a:endParaRPr>
+          </a:p>
+          <a:p>
+            <a:pPr marL="0" indent="0">
+              <a:buNone/>
+            </a:pPr>
+            <a:endParaRPr lang="en-US" sz="2000" dirty="0"/>
+          </a:p>
+          <a:p>
+            <a:pPr marL="0">
+              <a:spcBef>
+                <a:spcPts val="0"/>
+              </a:spcBef>
+            </a:pPr>
+            <a:r>
+              <a:rPr lang="en-US" sz="2000" dirty="0"/>
+              <a:t>Can multiple LTPs in different topologies point to the same SDP?</a:t>
+            </a:r>
+          </a:p>
+          <a:p>
+            <a:pPr marL="0">
+              <a:spcBef>
+                <a:spcPts val="0"/>
+              </a:spcBef>
+            </a:pPr>
+            <a:endParaRPr lang="en-US" sz="2000" dirty="0"/>
+          </a:p>
+          <a:p>
+            <a:pPr marL="0">
+              <a:spcBef>
+                <a:spcPts val="0"/>
+              </a:spcBef>
+            </a:pPr>
+            <a:r>
+              <a:rPr lang="en-US" sz="2000" dirty="0"/>
+              <a:t>Should an SDP exist before or at the time the LTP is created?</a:t>
+            </a:r>
+          </a:p>
+          <a:p>
+            <a:endParaRPr lang="en-US" sz="2400" dirty="0"/>
           </a:p>
           <a:p>
             <a:pPr marL="457200" lvl="1" indent="0">
               <a:buNone/>
             </a:pPr>
-            <a:r>
-              <a:rPr lang="en-US" dirty="0">
-                <a:hlinkClick r:id="rId3"/>
-              </a:rPr>
-              <a:t>https://github.com/aguoietf/ietf-network-slice-topology</a:t>
-            </a:r>
-            <a:endParaRPr lang="en-US" dirty="0"/>
-          </a:p>
-          <a:p>
-            <a:pPr marL="457200" lvl="1" indent="0">
-              <a:buNone/>
-            </a:pPr>
-            <a:endParaRPr lang="en-US" dirty="0"/>
-          </a:p>
-          <a:p>
-            <a:pPr marL="457200" lvl="1" indent="0">
-              <a:buNone/>
-            </a:pPr>
-            <a:endParaRPr lang="en-US" dirty="0"/>
-          </a:p>
-          <a:p>
-            <a:endParaRPr lang="en-US" dirty="0"/>
+            <a:endParaRPr lang="en-US" sz="2000" dirty="0"/>
           </a:p>
         </p:txBody>
       </p:sp>
     </p:spTree>
     <p:extLst>
       <p:ext uri="{BB962C8B-B14F-4D97-AF65-F5344CB8AC3E}">
-        <p14:creationId xmlns:p14="http://schemas.microsoft.com/office/powerpoint/2010/main" val="2009935748"/>
+        <p14:creationId xmlns:p14="http://schemas.microsoft.com/office/powerpoint/2010/main" val="1654884687"/>
       </p:ext>
     </p:extLst>
   </p:cSld>
@@ -6871,6 +7758,25 @@
 </file>
 
 <file path=customXml/item2.xml><?xml version="1.0" encoding="utf-8"?>
+<?mso-contentType ?>
+<FormTemplates xmlns="http://schemas.microsoft.com/sharepoint/v3/contenttype/forms">
+  <Display>DocumentLibraryForm</Display>
+  <Edit>DocumentLibraryForm</Edit>
+  <New>DocumentLibraryForm</New>
+</FormTemplates>
+</file>
+
+<file path=customXml/item3.xml><?xml version="1.0" encoding="utf-8"?>
+<?mso-contentType ?>
+<spe:Receivers xmlns:spe="http://schemas.microsoft.com/sharepoint/events"/>
+</file>
+
+<file path=customXml/item4.xml><?xml version="1.0" encoding="utf-8"?>
+<?mso-contentType ?>
+<SharedContentType xmlns="Microsoft.SharePoint.Taxonomy.ContentTypeSync" SourceId="34c87397-5fc1-491e-85e7-d6110dbe9cbd" ContentTypeId="0x0101" PreviousValue="false"/>
+</file>
+
+<file path=customXml/item5.xml><?xml version="1.0" encoding="utf-8"?>
 <ct:contentTypeSchema xmlns:ct="http://schemas.microsoft.com/office/2006/metadata/contentType" xmlns:ma="http://schemas.microsoft.com/office/2006/metadata/properties/metaAttributes" ct:_="" ma:_="" ma:contentTypeName="Document" ma:contentTypeID="0x01010083185B6FD968AC4F8244C98DADFCDDF2" ma:contentTypeVersion="10" ma:contentTypeDescription="Create a new document." ma:contentTypeScope="" ma:versionID="a0a5748a9dac91f93248b2b077c41dd7">
   <xsd:schema xmlns:xsd="http://www.w3.org/2001/XMLSchema" xmlns:xs="http://www.w3.org/2001/XMLSchema" xmlns:p="http://schemas.microsoft.com/office/2006/metadata/properties" xmlns:ns3="71c5aaf6-e6ce-465b-b873-5148d2a4c105" xmlns:ns4="687e87d0-d0a8-4c48-8f94-14f0c67212c5" xmlns:ns5="b4d06219-a142-4c5f-be55-53f74cb980c7" targetNamespace="http://schemas.microsoft.com/office/2006/metadata/properties" ma:root="true" ma:fieldsID="b06f86fc5fa60c034a6b2d88bb81de5b" ns3:_="" ns4:_="" ns5:_="">
     <xsd:import namespace="71c5aaf6-e6ce-465b-b873-5148d2a4c105"/>
@@ -7109,25 +8015,6 @@
 </ct:contentTypeSchema>
 </file>
 
-<file path=customXml/item3.xml><?xml version="1.0" encoding="utf-8"?>
-<?mso-contentType ?>
-<SharedContentType xmlns="Microsoft.SharePoint.Taxonomy.ContentTypeSync" SourceId="34c87397-5fc1-491e-85e7-d6110dbe9cbd" ContentTypeId="0x0101" PreviousValue="false"/>
-</file>
-
-<file path=customXml/item4.xml><?xml version="1.0" encoding="utf-8"?>
-<?mso-contentType ?>
-<spe:Receivers xmlns:spe="http://schemas.microsoft.com/sharepoint/events"/>
-</file>
-
-<file path=customXml/item5.xml><?xml version="1.0" encoding="utf-8"?>
-<?mso-contentType ?>
-<FormTemplates xmlns="http://schemas.microsoft.com/sharepoint/v3/contenttype/forms">
-  <Display>DocumentLibraryForm</Display>
-  <Edit>DocumentLibraryForm</Edit>
-  <New>DocumentLibraryForm</New>
-</FormTemplates>
-</file>
-
 <file path=customXml/itemProps1.xml><?xml version="1.0" encoding="utf-8"?>
 <ds:datastoreItem xmlns:ds="http://schemas.openxmlformats.org/officeDocument/2006/customXml" ds:itemID="{D1402BC5-1A46-47E2-B58E-ED5697CD9276}">
   <ds:schemaRefs>
@@ -7147,6 +8034,30 @@
 </file>
 
 <file path=customXml/itemProps2.xml><?xml version="1.0" encoding="utf-8"?>
+<ds:datastoreItem xmlns:ds="http://schemas.openxmlformats.org/officeDocument/2006/customXml" ds:itemID="{FFF5BEF5-BF1F-44F4-AFBC-1295B944FD55}">
+  <ds:schemaRefs>
+    <ds:schemaRef ds:uri="http://schemas.microsoft.com/sharepoint/v3/contenttype/forms"/>
+  </ds:schemaRefs>
+</ds:datastoreItem>
+</file>
+
+<file path=customXml/itemProps3.xml><?xml version="1.0" encoding="utf-8"?>
+<ds:datastoreItem xmlns:ds="http://schemas.openxmlformats.org/officeDocument/2006/customXml" ds:itemID="{917A1171-45E3-4E0C-B712-8306AE0B7411}">
+  <ds:schemaRefs>
+    <ds:schemaRef ds:uri="http://schemas.microsoft.com/sharepoint/events"/>
+  </ds:schemaRefs>
+</ds:datastoreItem>
+</file>
+
+<file path=customXml/itemProps4.xml><?xml version="1.0" encoding="utf-8"?>
+<ds:datastoreItem xmlns:ds="http://schemas.openxmlformats.org/officeDocument/2006/customXml" ds:itemID="{68412ECC-D61E-4B23-B7FF-722505864B65}">
+  <ds:schemaRefs>
+    <ds:schemaRef ds:uri="Microsoft.SharePoint.Taxonomy.ContentTypeSync"/>
+  </ds:schemaRefs>
+</ds:datastoreItem>
+</file>
+
+<file path=customXml/itemProps5.xml><?xml version="1.0" encoding="utf-8"?>
 <ds:datastoreItem xmlns:ds="http://schemas.openxmlformats.org/officeDocument/2006/customXml" ds:itemID="{334975F1-7A16-4F7E-84AE-F419563FD202}">
   <ds:schemaRefs>
     <ds:schemaRef ds:uri="http://schemas.microsoft.com/office/2006/metadata/contentType"/>
@@ -7164,28 +8075,4 @@
     <ds:schemaRef ds:uri="http://schemas.microsoft.com/internal/obd"/>
   </ds:schemaRefs>
 </ds:datastoreItem>
-</file>
-
-<file path=customXml/itemProps3.xml><?xml version="1.0" encoding="utf-8"?>
-<ds:datastoreItem xmlns:ds="http://schemas.openxmlformats.org/officeDocument/2006/customXml" ds:itemID="{68412ECC-D61E-4B23-B7FF-722505864B65}">
-  <ds:schemaRefs>
-    <ds:schemaRef ds:uri="Microsoft.SharePoint.Taxonomy.ContentTypeSync"/>
-  </ds:schemaRefs>
-</ds:datastoreItem>
-</file>
-
-<file path=customXml/itemProps4.xml><?xml version="1.0" encoding="utf-8"?>
-<ds:datastoreItem xmlns:ds="http://schemas.openxmlformats.org/officeDocument/2006/customXml" ds:itemID="{917A1171-45E3-4E0C-B712-8306AE0B7411}">
-  <ds:schemaRefs>
-    <ds:schemaRef ds:uri="http://schemas.microsoft.com/sharepoint/events"/>
-  </ds:schemaRefs>
-</ds:datastoreItem>
-</file>
-
-<file path=customXml/itemProps5.xml><?xml version="1.0" encoding="utf-8"?>
-<ds:datastoreItem xmlns:ds="http://schemas.openxmlformats.org/officeDocument/2006/customXml" ds:itemID="{FFF5BEF5-BF1F-44F4-AFBC-1295B944FD55}">
-  <ds:schemaRefs>
-    <ds:schemaRef ds:uri="http://schemas.microsoft.com/sharepoint/v3/contenttype/forms"/>
-  </ds:schemaRefs>
-</ds:datastoreItem>
 </file>
</xml_diff>